<commit_message>
Ajout partie edition de texte
</commit_message>
<xml_diff>
--- a/1. Présentation des outils Photoshop/Présentation des outils Photoshop.pptx
+++ b/1. Présentation des outils Photoshop/Présentation des outils Photoshop.pptx
@@ -18,12 +18,13 @@
     <p:sldId id="266" r:id="rId12"/>
     <p:sldId id="267" r:id="rId13"/>
     <p:sldId id="268" r:id="rId14"/>
-    <p:sldId id="270" r:id="rId15"/>
-    <p:sldId id="269" r:id="rId16"/>
-    <p:sldId id="271" r:id="rId17"/>
-    <p:sldId id="272" r:id="rId18"/>
-    <p:sldId id="273" r:id="rId19"/>
-    <p:sldId id="274" r:id="rId20"/>
+    <p:sldId id="275" r:id="rId15"/>
+    <p:sldId id="270" r:id="rId16"/>
+    <p:sldId id="269" r:id="rId17"/>
+    <p:sldId id="271" r:id="rId18"/>
+    <p:sldId id="272" r:id="rId19"/>
+    <p:sldId id="273" r:id="rId20"/>
+    <p:sldId id="274" r:id="rId21"/>
   </p:sldIdLst>
   <p:sldSz cx="12192000" cy="6858000"/>
   <p:notesSz cx="6858000" cy="9144000"/>
@@ -6960,25 +6961,26 @@
         </p:nvSpPr>
         <p:spPr/>
         <p:txBody>
-          <a:bodyPr/>
-          <a:lstStyle/>
-          <a:p>
-            <a:pPr marL="457200" indent="-457200"/>
-            <a:r>
-              <a:rPr lang="fr-MA" dirty="0" smtClean="0"/>
+          <a:bodyPr>
+            <a:normAutofit/>
+          </a:bodyPr>
+          <a:lstStyle/>
+          <a:p>
+            <a:r>
+              <a:rPr lang="fr-MA" dirty="0"/>
               <a:t>Outils de dessin et de texte </a:t>
             </a:r>
             <a:r>
               <a:rPr lang="fr-MA" sz="2000" dirty="0"/>
               <a:t>(suite)</a:t>
             </a:r>
-            <a:endParaRPr lang="fr-MA" dirty="0"/>
+            <a:endParaRPr lang="fr-MA" sz="2200" dirty="0"/>
           </a:p>
         </p:txBody>
       </p:sp>
       <p:pic>
         <p:nvPicPr>
-          <p:cNvPr id="13314" name="Picture 2" descr="https://helpx.adobe.com/content/dam/help/images/hwa_47.png"/>
+          <p:cNvPr id="1026" name="Picture 2" descr="https://helpx.adobe.com/content/dam/help/images/hwa_27.png"/>
           <p:cNvPicPr>
             <a:picLocks noChangeAspect="1" noChangeArrowheads="1"/>
           </p:cNvPicPr>
@@ -6999,7 +7001,7 @@
         </p:blipFill>
         <p:spPr bwMode="auto">
           <a:xfrm>
-            <a:off x="1295402" y="2782463"/>
+            <a:off x="1295402" y="2772631"/>
             <a:ext cx="1266825" cy="1266826"/>
           </a:xfrm>
           <a:prstGeom prst="rect">
@@ -7019,14 +7021,14 @@
       </p:pic>
       <p:sp>
         <p:nvSpPr>
-          <p:cNvPr id="3" name="Rectangle 2"/>
+          <p:cNvPr id="5" name="Rectangle 4"/>
           <p:cNvSpPr/>
           <p:nvPr/>
         </p:nvSpPr>
         <p:spPr>
           <a:xfrm>
-            <a:off x="3048000" y="4717501"/>
-            <a:ext cx="6096000" cy="923330"/>
+            <a:off x="3048000" y="3105835"/>
+            <a:ext cx="6096000" cy="646331"/>
           </a:xfrm>
           <a:prstGeom prst="rect">
             <a:avLst/>
@@ -7045,7 +7047,7 @@
                 </a:solidFill>
                 <a:latin typeface="inherit"/>
               </a:rPr>
-              <a:t>Les outils de forme et l’outil Trait</a:t>
+              <a:t>Les outils de texte</a:t>
             </a:r>
             <a:r>
               <a:rPr lang="fr-FR" i="1" dirty="0">
@@ -7054,7 +7056,7 @@
                 </a:solidFill>
                 <a:latin typeface="adobe-clean"/>
               </a:rPr>
-              <a:t> permettent de dessiner des formes et de tracer des lignes dans un calque simple comme dans un calque de forme.</a:t>
+              <a:t> permettent de saisir du texte dans une image.</a:t>
             </a:r>
             <a:endParaRPr lang="fr-MA" dirty="0"/>
           </a:p>
@@ -7062,7 +7064,7 @@
       </p:sp>
       <p:pic>
         <p:nvPicPr>
-          <p:cNvPr id="13316" name="Picture 4" descr="https://helpx.adobe.com/content/dam/help/images/hwa_29.png"/>
+          <p:cNvPr id="1028" name="Picture 4" descr="https://helpx.adobe.com/content/dam/help/images/hwa_09.png"/>
           <p:cNvPicPr>
             <a:picLocks noChangeAspect="1" noChangeArrowheads="1"/>
           </p:cNvPicPr>
@@ -7083,7 +7085,7 @@
         </p:blipFill>
         <p:spPr bwMode="auto">
           <a:xfrm>
-            <a:off x="1295401" y="4545753"/>
+            <a:off x="1295401" y="4526089"/>
             <a:ext cx="1266825" cy="1266826"/>
           </a:xfrm>
           <a:prstGeom prst="rect">
@@ -7103,13 +7105,13 @@
       </p:pic>
       <p:sp>
         <p:nvSpPr>
-          <p:cNvPr id="5" name="Rectangle 4"/>
+          <p:cNvPr id="6" name="Rectangle 5"/>
           <p:cNvSpPr/>
           <p:nvPr/>
         </p:nvSpPr>
         <p:spPr>
           <a:xfrm>
-            <a:off x="3048000" y="3105835"/>
+            <a:off x="3048000" y="5013293"/>
             <a:ext cx="6096000" cy="646331"/>
           </a:xfrm>
           <a:prstGeom prst="rect">
@@ -7129,7 +7131,7 @@
                 </a:solidFill>
                 <a:latin typeface="inherit"/>
               </a:rPr>
-              <a:t>L’outil Forme personnalisée</a:t>
+              <a:t>Les outils de masque de texte</a:t>
             </a:r>
             <a:r>
               <a:rPr lang="fr-FR" i="1" dirty="0">
@@ -7138,7 +7140,7 @@
                 </a:solidFill>
                 <a:latin typeface="adobe-clean"/>
               </a:rPr>
-              <a:t> permet d’appliquer des formes personnalisées à partir d’une liste.</a:t>
+              <a:t> permettent de créer une sélection épousant la forme du texte.</a:t>
             </a:r>
             <a:endParaRPr lang="fr-MA" dirty="0"/>
           </a:p>
@@ -7147,7 +7149,7 @@
     </p:spTree>
     <p:extLst>
       <p:ext uri="{BB962C8B-B14F-4D97-AF65-F5344CB8AC3E}">
-        <p14:creationId xmlns:p14="http://schemas.microsoft.com/office/powerpoint/2010/main" val="2202131712"/>
+        <p14:creationId xmlns:p14="http://schemas.microsoft.com/office/powerpoint/2010/main" val="4125858014"/>
       </p:ext>
     </p:extLst>
   </p:cSld>
@@ -7193,29 +7195,25 @@
         </p:nvSpPr>
         <p:spPr/>
         <p:txBody>
-          <a:bodyPr>
-            <a:normAutofit/>
-          </a:bodyPr>
-          <a:lstStyle/>
-          <a:p>
-            <a:r>
-              <a:rPr lang="fr-MA" dirty="0"/>
-              <a:t>Navigation, notes </a:t>
-            </a:r>
+          <a:bodyPr/>
+          <a:lstStyle/>
+          <a:p>
+            <a:pPr marL="457200" indent="-457200"/>
             <a:r>
               <a:rPr lang="fr-MA" dirty="0" smtClean="0"/>
-              <a:t>et outils </a:t>
-            </a:r>
-            <a:r>
-              <a:rPr lang="fr-MA" dirty="0"/>
-              <a:t>de mesure</a:t>
-            </a:r>
+              <a:t>Outils de dessin et de texte </a:t>
+            </a:r>
+            <a:r>
+              <a:rPr lang="fr-MA" sz="2000" dirty="0"/>
+              <a:t>(suite)</a:t>
+            </a:r>
+            <a:endParaRPr lang="fr-MA" dirty="0"/>
           </a:p>
         </p:txBody>
       </p:sp>
       <p:pic>
         <p:nvPicPr>
-          <p:cNvPr id="12296" name="Picture 8" descr="https://helpx.adobe.com/content/dam/help/images/hwa_33.png"/>
+          <p:cNvPr id="13314" name="Picture 2" descr="https://helpx.adobe.com/content/dam/help/images/hwa_47.png"/>
           <p:cNvPicPr>
             <a:picLocks noChangeAspect="1" noChangeArrowheads="1"/>
           </p:cNvPicPr>
@@ -7236,7 +7234,7 @@
         </p:blipFill>
         <p:spPr bwMode="auto">
           <a:xfrm>
-            <a:off x="1295402" y="2752966"/>
+            <a:off x="1295402" y="2782463"/>
             <a:ext cx="1266825" cy="1266826"/>
           </a:xfrm>
           <a:prstGeom prst="rect">
@@ -7256,14 +7254,14 @@
       </p:pic>
       <p:sp>
         <p:nvSpPr>
-          <p:cNvPr id="8" name="Rectangle 7"/>
+          <p:cNvPr id="3" name="Rectangle 2"/>
           <p:cNvSpPr/>
           <p:nvPr/>
         </p:nvSpPr>
         <p:spPr>
           <a:xfrm>
-            <a:off x="3048000" y="3105835"/>
-            <a:ext cx="6096000" cy="646331"/>
+            <a:off x="3048000" y="4717501"/>
+            <a:ext cx="6096000" cy="923330"/>
           </a:xfrm>
           <a:prstGeom prst="rect">
             <a:avLst/>
@@ -7282,7 +7280,7 @@
                 </a:solidFill>
                 <a:latin typeface="inherit"/>
               </a:rPr>
-              <a:t>L’outil Main</a:t>
+              <a:t>Les outils de forme et l’outil Trait</a:t>
             </a:r>
             <a:r>
               <a:rPr lang="fr-FR" i="1" dirty="0">
@@ -7291,7 +7289,7 @@
                 </a:solidFill>
                 <a:latin typeface="adobe-clean"/>
               </a:rPr>
-              <a:t> permet de déplacer une image à l’intérieur de la fenêtre.</a:t>
+              <a:t> permettent de dessiner des formes et de tracer des lignes dans un calque simple comme dans un calque de forme.</a:t>
             </a:r>
             <a:endParaRPr lang="fr-MA" dirty="0"/>
           </a:p>
@@ -7299,7 +7297,7 @@
       </p:sp>
       <p:pic>
         <p:nvPicPr>
-          <p:cNvPr id="12298" name="Picture 10" descr="https://helpx.adobe.com/content/dam/help/images/wa_rotation_tool.png"/>
+          <p:cNvPr id="13316" name="Picture 4" descr="https://helpx.adobe.com/content/dam/help/images/hwa_29.png"/>
           <p:cNvPicPr>
             <a:picLocks noChangeAspect="1" noChangeArrowheads="1"/>
           </p:cNvPicPr>
@@ -7320,7 +7318,7 @@
         </p:blipFill>
         <p:spPr bwMode="auto">
           <a:xfrm>
-            <a:off x="1295402" y="4486759"/>
+            <a:off x="1295401" y="4545753"/>
             <a:ext cx="1266825" cy="1266826"/>
           </a:xfrm>
           <a:prstGeom prst="rect">
@@ -7340,13 +7338,13 @@
       </p:pic>
       <p:sp>
         <p:nvSpPr>
-          <p:cNvPr id="9" name="Rectangle 8"/>
+          <p:cNvPr id="5" name="Rectangle 4"/>
           <p:cNvSpPr/>
           <p:nvPr/>
         </p:nvSpPr>
         <p:spPr>
           <a:xfrm>
-            <a:off x="3048000" y="4875641"/>
+            <a:off x="3048000" y="3105835"/>
             <a:ext cx="6096000" cy="646331"/>
           </a:xfrm>
           <a:prstGeom prst="rect">
@@ -7366,7 +7364,7 @@
                 </a:solidFill>
                 <a:latin typeface="inherit"/>
               </a:rPr>
-              <a:t>L’outil Rotation de l’affichage</a:t>
+              <a:t>L’outil Forme personnalisée</a:t>
             </a:r>
             <a:r>
               <a:rPr lang="fr-FR" i="1" dirty="0">
@@ -7375,7 +7373,7 @@
                 </a:solidFill>
                 <a:latin typeface="adobe-clean"/>
               </a:rPr>
-              <a:t> fait pivoter la zone de travail de manière non destructrice.</a:t>
+              <a:t> permet d’appliquer des formes personnalisées à partir d’une liste.</a:t>
             </a:r>
             <a:endParaRPr lang="fr-MA" dirty="0"/>
           </a:p>
@@ -7384,7 +7382,7 @@
     </p:spTree>
     <p:extLst>
       <p:ext uri="{BB962C8B-B14F-4D97-AF65-F5344CB8AC3E}">
-        <p14:creationId xmlns:p14="http://schemas.microsoft.com/office/powerpoint/2010/main" val="240305533"/>
+        <p14:creationId xmlns:p14="http://schemas.microsoft.com/office/powerpoint/2010/main" val="2202131712"/>
       </p:ext>
     </p:extLst>
   </p:cSld>
@@ -7437,31 +7435,22 @@
           <a:p>
             <a:r>
               <a:rPr lang="fr-MA" dirty="0"/>
-              <a:t>Navigation, notes et </a:t>
+              <a:t>Navigation, notes </a:t>
             </a:r>
             <a:r>
               <a:rPr lang="fr-MA" dirty="0" smtClean="0"/>
-              <a:t>outils </a:t>
+              <a:t>et outils </a:t>
             </a:r>
             <a:r>
               <a:rPr lang="fr-MA" dirty="0"/>
-              <a:t>de </a:t>
-            </a:r>
-            <a:r>
-              <a:rPr lang="fr-MA" dirty="0" smtClean="0"/>
-              <a:t>mesure </a:t>
-            </a:r>
-            <a:r>
-              <a:rPr lang="fr-MA" sz="2200" dirty="0" smtClean="0"/>
-              <a:t>(suite)</a:t>
-            </a:r>
-            <a:endParaRPr lang="fr-MA" sz="2200" dirty="0"/>
+              <a:t>de mesure</a:t>
+            </a:r>
           </a:p>
         </p:txBody>
       </p:sp>
       <p:pic>
         <p:nvPicPr>
-          <p:cNvPr id="14338" name="Picture 2" descr="https://helpx.adobe.com/content/dam/help/images/hwa_34.png"/>
+          <p:cNvPr id="12296" name="Picture 8" descr="https://helpx.adobe.com/content/dam/help/images/hwa_33.png"/>
           <p:cNvPicPr>
             <a:picLocks noChangeAspect="1" noChangeArrowheads="1"/>
           </p:cNvPicPr>
@@ -7502,13 +7491,13 @@
       </p:pic>
       <p:sp>
         <p:nvSpPr>
-          <p:cNvPr id="3" name="Rectangle 2"/>
+          <p:cNvPr id="8" name="Rectangle 7"/>
           <p:cNvSpPr/>
           <p:nvPr/>
         </p:nvSpPr>
         <p:spPr>
           <a:xfrm>
-            <a:off x="3048000" y="3063213"/>
+            <a:off x="3048000" y="3105835"/>
             <a:ext cx="6096000" cy="646331"/>
           </a:xfrm>
           <a:prstGeom prst="rect">
@@ -7528,7 +7517,7 @@
                 </a:solidFill>
                 <a:latin typeface="inherit"/>
               </a:rPr>
-              <a:t>L’outil Zoom</a:t>
+              <a:t>L’outil Main</a:t>
             </a:r>
             <a:r>
               <a:rPr lang="fr-FR" i="1" dirty="0">
@@ -7537,7 +7526,7 @@
                 </a:solidFill>
                 <a:latin typeface="adobe-clean"/>
               </a:rPr>
-              <a:t> permet d’agrandir et de réduire l’affichage d’une image.</a:t>
+              <a:t> permet de déplacer une image à l’intérieur de la fenêtre.</a:t>
             </a:r>
             <a:endParaRPr lang="fr-MA" dirty="0"/>
           </a:p>
@@ -7545,7 +7534,7 @@
       </p:sp>
       <p:pic>
         <p:nvPicPr>
-          <p:cNvPr id="14340" name="Picture 4" descr="https://helpx.adobe.com/content/dam/help/images/wa_note_tool.png"/>
+          <p:cNvPr id="12298" name="Picture 10" descr="https://helpx.adobe.com/content/dam/help/images/wa_rotation_tool.png"/>
           <p:cNvPicPr>
             <a:picLocks noChangeAspect="1" noChangeArrowheads="1"/>
           </p:cNvPicPr>
@@ -7566,7 +7555,7 @@
         </p:blipFill>
         <p:spPr bwMode="auto">
           <a:xfrm>
-            <a:off x="1295401" y="4486759"/>
+            <a:off x="1295402" y="4486759"/>
             <a:ext cx="1266825" cy="1266826"/>
           </a:xfrm>
           <a:prstGeom prst="rect">
@@ -7586,13 +7575,13 @@
       </p:pic>
       <p:sp>
         <p:nvSpPr>
-          <p:cNvPr id="4" name="Rectangle 3"/>
+          <p:cNvPr id="9" name="Rectangle 8"/>
           <p:cNvSpPr/>
           <p:nvPr/>
         </p:nvSpPr>
         <p:spPr>
           <a:xfrm>
-            <a:off x="3048000" y="4944468"/>
+            <a:off x="3048000" y="4875641"/>
             <a:ext cx="6096000" cy="646331"/>
           </a:xfrm>
           <a:prstGeom prst="rect">
@@ -7612,7 +7601,7 @@
                 </a:solidFill>
                 <a:latin typeface="inherit"/>
               </a:rPr>
-              <a:t>L’outil Annotation</a:t>
+              <a:t>L’outil Rotation de l’affichage</a:t>
             </a:r>
             <a:r>
               <a:rPr lang="fr-FR" i="1" dirty="0">
@@ -7621,7 +7610,7 @@
                 </a:solidFill>
                 <a:latin typeface="adobe-clean"/>
               </a:rPr>
-              <a:t> crée des annotations qui peuvent être jointes à une image.</a:t>
+              <a:t> fait pivoter la zone de travail de manière non destructrice.</a:t>
             </a:r>
             <a:endParaRPr lang="fr-MA" dirty="0"/>
           </a:p>
@@ -7630,7 +7619,7 @@
     </p:spTree>
     <p:extLst>
       <p:ext uri="{BB962C8B-B14F-4D97-AF65-F5344CB8AC3E}">
-        <p14:creationId xmlns:p14="http://schemas.microsoft.com/office/powerpoint/2010/main" val="849194670"/>
+        <p14:creationId xmlns:p14="http://schemas.microsoft.com/office/powerpoint/2010/main" val="240305533"/>
       </p:ext>
     </p:extLst>
   </p:cSld>
@@ -7707,7 +7696,7 @@
       </p:sp>
       <p:pic>
         <p:nvPicPr>
-          <p:cNvPr id="15362" name="Picture 2" descr="https://helpx.adobe.com/content/dam/help/images/hwa_31.png"/>
+          <p:cNvPr id="14338" name="Picture 2" descr="https://helpx.adobe.com/content/dam/help/images/hwa_34.png"/>
           <p:cNvPicPr>
             <a:picLocks noChangeAspect="1" noChangeArrowheads="1"/>
           </p:cNvPicPr>
@@ -7748,13 +7737,13 @@
       </p:pic>
       <p:sp>
         <p:nvSpPr>
-          <p:cNvPr id="5" name="Rectangle 4"/>
+          <p:cNvPr id="3" name="Rectangle 2"/>
           <p:cNvSpPr/>
           <p:nvPr/>
         </p:nvSpPr>
         <p:spPr>
           <a:xfrm>
-            <a:off x="3048000" y="3105835"/>
+            <a:off x="3048000" y="3063213"/>
             <a:ext cx="6096000" cy="646331"/>
           </a:xfrm>
           <a:prstGeom prst="rect">
@@ -7774,7 +7763,7 @@
                 </a:solidFill>
                 <a:latin typeface="inherit"/>
               </a:rPr>
-              <a:t>L’outil Pipette</a:t>
+              <a:t>L’outil Zoom</a:t>
             </a:r>
             <a:r>
               <a:rPr lang="fr-FR" i="1" dirty="0">
@@ -7783,7 +7772,7 @@
                 </a:solidFill>
                 <a:latin typeface="adobe-clean"/>
               </a:rPr>
-              <a:t> permet de prélever les couleurs d’une image.</a:t>
+              <a:t> permet d’agrandir et de réduire l’affichage d’une image.</a:t>
             </a:r>
             <a:endParaRPr lang="fr-MA" dirty="0"/>
           </a:p>
@@ -7791,7 +7780,7 @@
       </p:sp>
       <p:pic>
         <p:nvPicPr>
-          <p:cNvPr id="15364" name="Picture 4" descr="https://helpx.adobe.com/content/dam/help/images/hwa_99.png"/>
+          <p:cNvPr id="14340" name="Picture 4" descr="https://helpx.adobe.com/content/dam/help/images/wa_note_tool.png"/>
           <p:cNvPicPr>
             <a:picLocks noChangeAspect="1" noChangeArrowheads="1"/>
           </p:cNvPicPr>
@@ -7812,7 +7801,7 @@
         </p:blipFill>
         <p:spPr bwMode="auto">
           <a:xfrm>
-            <a:off x="1295402" y="4486759"/>
+            <a:off x="1295401" y="4486759"/>
             <a:ext cx="1266825" cy="1266826"/>
           </a:xfrm>
           <a:prstGeom prst="rect">
@@ -7832,13 +7821,13 @@
       </p:pic>
       <p:sp>
         <p:nvSpPr>
-          <p:cNvPr id="6" name="Rectangle 5"/>
+          <p:cNvPr id="4" name="Rectangle 3"/>
           <p:cNvSpPr/>
           <p:nvPr/>
         </p:nvSpPr>
         <p:spPr>
           <a:xfrm>
-            <a:off x="3048000" y="4797006"/>
+            <a:off x="3048000" y="4944468"/>
             <a:ext cx="6096000" cy="646331"/>
           </a:xfrm>
           <a:prstGeom prst="rect">
@@ -7858,7 +7847,7 @@
                 </a:solidFill>
                 <a:latin typeface="inherit"/>
               </a:rPr>
-              <a:t>L’outil Echantillonnage de couleur</a:t>
+              <a:t>L’outil Annotation</a:t>
             </a:r>
             <a:r>
               <a:rPr lang="fr-FR" i="1" dirty="0">
@@ -7867,7 +7856,7 @@
                 </a:solidFill>
                 <a:latin typeface="adobe-clean"/>
               </a:rPr>
-              <a:t> affiche les valeurs de couleur pour quatre zones maximum.</a:t>
+              <a:t> crée des annotations qui peuvent être jointes à une image.</a:t>
             </a:r>
             <a:endParaRPr lang="fr-MA" dirty="0"/>
           </a:p>
@@ -7876,7 +7865,7 @@
     </p:spTree>
     <p:extLst>
       <p:ext uri="{BB962C8B-B14F-4D97-AF65-F5344CB8AC3E}">
-        <p14:creationId xmlns:p14="http://schemas.microsoft.com/office/powerpoint/2010/main" val="4289117708"/>
+        <p14:creationId xmlns:p14="http://schemas.microsoft.com/office/powerpoint/2010/main" val="849194670"/>
       </p:ext>
     </p:extLst>
   </p:cSld>
@@ -7953,7 +7942,7 @@
       </p:sp>
       <p:pic>
         <p:nvPicPr>
-          <p:cNvPr id="16386" name="Picture 2" descr="https://helpx.adobe.com/content/dam/help/images/hwa_32.png"/>
+          <p:cNvPr id="15362" name="Picture 2" descr="https://helpx.adobe.com/content/dam/help/images/hwa_31.png"/>
           <p:cNvPicPr>
             <a:picLocks noChangeAspect="1" noChangeArrowheads="1"/>
           </p:cNvPicPr>
@@ -7974,7 +7963,7 @@
         </p:blipFill>
         <p:spPr bwMode="auto">
           <a:xfrm>
-            <a:off x="1295402" y="2723469"/>
+            <a:off x="1295402" y="2752966"/>
             <a:ext cx="1266825" cy="1266826"/>
           </a:xfrm>
           <a:prstGeom prst="rect">
@@ -7994,7 +7983,7 @@
       </p:pic>
       <p:sp>
         <p:nvSpPr>
-          <p:cNvPr id="3" name="Rectangle 2"/>
+          <p:cNvPr id="5" name="Rectangle 4"/>
           <p:cNvSpPr/>
           <p:nvPr/>
         </p:nvSpPr>
@@ -8020,7 +8009,7 @@
                 </a:solidFill>
                 <a:latin typeface="inherit"/>
               </a:rPr>
-              <a:t>L’outil Règle</a:t>
+              <a:t>L’outil Pipette</a:t>
             </a:r>
             <a:r>
               <a:rPr lang="fr-FR" i="1" dirty="0">
@@ -8029,7 +8018,91 @@
                 </a:solidFill>
                 <a:latin typeface="adobe-clean"/>
               </a:rPr>
-              <a:t> permet de mesurer les distances, les positions et les angles.</a:t>
+              <a:t> permet de prélever les couleurs d’une image.</a:t>
+            </a:r>
+            <a:endParaRPr lang="fr-MA" dirty="0"/>
+          </a:p>
+        </p:txBody>
+      </p:sp>
+      <p:pic>
+        <p:nvPicPr>
+          <p:cNvPr id="15364" name="Picture 4" descr="https://helpx.adobe.com/content/dam/help/images/hwa_99.png"/>
+          <p:cNvPicPr>
+            <a:picLocks noChangeAspect="1" noChangeArrowheads="1"/>
+          </p:cNvPicPr>
+          <p:nvPr/>
+        </p:nvPicPr>
+        <p:blipFill>
+          <a:blip r:embed="rId3">
+            <a:extLst>
+              <a:ext uri="{28A0092B-C50C-407E-A947-70E740481C1C}">
+                <a14:useLocalDpi xmlns:a14="http://schemas.microsoft.com/office/drawing/2010/main" val="0"/>
+              </a:ext>
+            </a:extLst>
+          </a:blip>
+          <a:srcRect/>
+          <a:stretch>
+            <a:fillRect/>
+          </a:stretch>
+        </p:blipFill>
+        <p:spPr bwMode="auto">
+          <a:xfrm>
+            <a:off x="1295402" y="4486759"/>
+            <a:ext cx="1266825" cy="1266826"/>
+          </a:xfrm>
+          <a:prstGeom prst="rect">
+            <a:avLst/>
+          </a:prstGeom>
+          <a:noFill/>
+          <a:extLst>
+            <a:ext uri="{909E8E84-426E-40DD-AFC4-6F175D3DCCD1}">
+              <a14:hiddenFill xmlns:a14="http://schemas.microsoft.com/office/drawing/2010/main">
+                <a:solidFill>
+                  <a:srgbClr val="FFFFFF"/>
+                </a:solidFill>
+              </a14:hiddenFill>
+            </a:ext>
+          </a:extLst>
+        </p:spPr>
+      </p:pic>
+      <p:sp>
+        <p:nvSpPr>
+          <p:cNvPr id="6" name="Rectangle 5"/>
+          <p:cNvSpPr/>
+          <p:nvPr/>
+        </p:nvSpPr>
+        <p:spPr>
+          <a:xfrm>
+            <a:off x="3048000" y="4797006"/>
+            <a:ext cx="6096000" cy="646331"/>
+          </a:xfrm>
+          <a:prstGeom prst="rect">
+            <a:avLst/>
+          </a:prstGeom>
+        </p:spPr>
+        <p:txBody>
+          <a:bodyPr>
+            <a:spAutoFit/>
+          </a:bodyPr>
+          <a:lstStyle/>
+          <a:p>
+            <a:r>
+              <a:rPr lang="fr-FR" b="1" i="1" dirty="0">
+                <a:solidFill>
+                  <a:srgbClr val="333333"/>
+                </a:solidFill>
+                <a:latin typeface="inherit"/>
+              </a:rPr>
+              <a:t>L’outil Echantillonnage de couleur</a:t>
+            </a:r>
+            <a:r>
+              <a:rPr lang="fr-FR" i="1" dirty="0">
+                <a:solidFill>
+                  <a:srgbClr val="333333"/>
+                </a:solidFill>
+                <a:latin typeface="adobe-clean"/>
+              </a:rPr>
+              <a:t> affiche les valeurs de couleur pour quatre zones maximum.</a:t>
             </a:r>
             <a:endParaRPr lang="fr-MA" dirty="0"/>
           </a:p>
@@ -8038,7 +8111,7 @@
     </p:spTree>
     <p:extLst>
       <p:ext uri="{BB962C8B-B14F-4D97-AF65-F5344CB8AC3E}">
-        <p14:creationId xmlns:p14="http://schemas.microsoft.com/office/powerpoint/2010/main" val="1584264251"/>
+        <p14:creationId xmlns:p14="http://schemas.microsoft.com/office/powerpoint/2010/main" val="4289117708"/>
       </p:ext>
     </p:extLst>
   </p:cSld>
@@ -8090,85 +8163,108 @@
           <a:lstStyle/>
           <a:p>
             <a:r>
-              <a:rPr lang="fr-FR" dirty="0" smtClean="0"/>
-              <a:t>Exercice</a:t>
-            </a:r>
-            <a:endParaRPr lang="fr-MA" dirty="0"/>
-          </a:p>
-        </p:txBody>
-      </p:sp>
-      <p:sp>
-        <p:nvSpPr>
-          <p:cNvPr id="4" name="Rectangle 3"/>
-          <p:cNvSpPr/>
+              <a:rPr lang="fr-MA" dirty="0"/>
+              <a:t>Navigation, notes et </a:t>
+            </a:r>
+            <a:r>
+              <a:rPr lang="fr-MA" dirty="0" smtClean="0"/>
+              <a:t>outils </a:t>
+            </a:r>
+            <a:r>
+              <a:rPr lang="fr-MA" dirty="0"/>
+              <a:t>de </a:t>
+            </a:r>
+            <a:r>
+              <a:rPr lang="fr-MA" dirty="0" smtClean="0"/>
+              <a:t>mesure </a:t>
+            </a:r>
+            <a:r>
+              <a:rPr lang="fr-MA" sz="2200" dirty="0" smtClean="0"/>
+              <a:t>(suite)</a:t>
+            </a:r>
+            <a:endParaRPr lang="fr-MA" sz="2200" dirty="0"/>
+          </a:p>
+        </p:txBody>
+      </p:sp>
+      <p:pic>
+        <p:nvPicPr>
+          <p:cNvPr id="16386" name="Picture 2" descr="https://helpx.adobe.com/content/dam/help/images/hwa_32.png"/>
+          <p:cNvPicPr>
+            <a:picLocks noChangeAspect="1" noChangeArrowheads="1"/>
+          </p:cNvPicPr>
           <p:nvPr/>
-        </p:nvSpPr>
-        <p:spPr>
-          <a:xfrm>
-            <a:off x="7537535" y="5938373"/>
-            <a:ext cx="4171719" cy="369332"/>
-          </a:xfrm>
-          <a:prstGeom prst="rect">
-            <a:avLst/>
-          </a:prstGeom>
-        </p:spPr>
-        <p:txBody>
-          <a:bodyPr wrap="none">
-            <a:spAutoFit/>
-          </a:bodyPr>
-          <a:lstStyle/>
-          <a:p>
-            <a:r>
-              <a:rPr lang="fr-MA" dirty="0" smtClean="0"/>
-              <a:t>Photos disponibles dans le dossier Exercice</a:t>
-            </a:r>
-            <a:endParaRPr lang="fr-MA" dirty="0"/>
-          </a:p>
-        </p:txBody>
-      </p:sp>
-      <p:sp>
-        <p:nvSpPr>
-          <p:cNvPr id="3" name="ZoneTexte 2"/>
-          <p:cNvSpPr txBox="1"/>
-          <p:nvPr/>
-        </p:nvSpPr>
-        <p:spPr>
-          <a:xfrm>
-            <a:off x="1956619" y="2772697"/>
-            <a:ext cx="8278762" cy="2585323"/>
+        </p:nvPicPr>
+        <p:blipFill>
+          <a:blip r:embed="rId2">
+            <a:extLst>
+              <a:ext uri="{28A0092B-C50C-407E-A947-70E740481C1C}">
+                <a14:useLocalDpi xmlns:a14="http://schemas.microsoft.com/office/drawing/2010/main" val="0"/>
+              </a:ext>
+            </a:extLst>
+          </a:blip>
+          <a:srcRect/>
+          <a:stretch>
+            <a:fillRect/>
+          </a:stretch>
+        </p:blipFill>
+        <p:spPr bwMode="auto">
+          <a:xfrm>
+            <a:off x="1295402" y="2723469"/>
+            <a:ext cx="1266825" cy="1266826"/>
           </a:xfrm>
           <a:prstGeom prst="rect">
             <a:avLst/>
           </a:prstGeom>
           <a:noFill/>
-        </p:spPr>
-        <p:txBody>
-          <a:bodyPr wrap="square" rtlCol="0">
+          <a:extLst>
+            <a:ext uri="{909E8E84-426E-40DD-AFC4-6F175D3DCCD1}">
+              <a14:hiddenFill xmlns:a14="http://schemas.microsoft.com/office/drawing/2010/main">
+                <a:solidFill>
+                  <a:srgbClr val="FFFFFF"/>
+                </a:solidFill>
+              </a14:hiddenFill>
+            </a:ext>
+          </a:extLst>
+        </p:spPr>
+      </p:pic>
+      <p:sp>
+        <p:nvSpPr>
+          <p:cNvPr id="3" name="Rectangle 2"/>
+          <p:cNvSpPr/>
+          <p:nvPr/>
+        </p:nvSpPr>
+        <p:spPr>
+          <a:xfrm>
+            <a:off x="3048000" y="3105835"/>
+            <a:ext cx="6096000" cy="646331"/>
+          </a:xfrm>
+          <a:prstGeom prst="rect">
+            <a:avLst/>
+          </a:prstGeom>
+        </p:spPr>
+        <p:txBody>
+          <a:bodyPr>
             <a:spAutoFit/>
           </a:bodyPr>
           <a:lstStyle/>
           <a:p>
             <a:r>
-              <a:rPr lang="fr-FR" dirty="0" smtClean="0"/>
-              <a:t>Un couple du  nom de Jonathan et Mélanie viennent de passer leurs vacances aux Maldives, mais souhaitent cacher cela au père de Jonathan car il serait très mécontent de voir son fils dépenser excessivement l’argent qu’il lui a légué.</a:t>
-            </a:r>
-          </a:p>
-          <a:p>
-            <a:endParaRPr lang="fr-FR" dirty="0"/>
-          </a:p>
-          <a:p>
-            <a:r>
-              <a:rPr lang="fr-FR" dirty="0" smtClean="0"/>
-              <a:t>Aidez Jonathan a pouvoir envoyer une de ses photos de vacances à son père, sans que ce dernier s’aperçoit qu’il est aux îles Maldives.</a:t>
-            </a:r>
-          </a:p>
-          <a:p>
-            <a:endParaRPr lang="fr-FR" dirty="0"/>
-          </a:p>
-          <a:p>
-            <a:r>
-              <a:rPr lang="fr-FR" dirty="0" smtClean="0"/>
-              <a:t>N.B: Il semblerait que Jonathan nous a envoyé deux photos, une pour le découpage et l’autre ou il veut qu’on l’incruste avec sa conjointe Mélanie.</a:t>
+              <a:rPr lang="fr-FR" b="1" i="1" dirty="0">
+                <a:solidFill>
+                  <a:srgbClr val="333333"/>
+                </a:solidFill>
+                <a:latin typeface="inherit"/>
+              </a:rPr>
+              <a:t>L’outil Règle</a:t>
+            </a:r>
+            <a:r>
+              <a:rPr lang="fr-FR" i="1" dirty="0">
+                <a:solidFill>
+                  <a:srgbClr val="333333"/>
+                </a:solidFill>
+                <a:latin typeface="adobe-clean"/>
+              </a:rPr>
+              <a:t> permet de mesurer les distances, les positions et les angles.</a:t>
             </a:r>
             <a:endParaRPr lang="fr-MA" dirty="0"/>
           </a:p>
@@ -8177,7 +8273,7 @@
     </p:spTree>
     <p:extLst>
       <p:ext uri="{BB962C8B-B14F-4D97-AF65-F5344CB8AC3E}">
-        <p14:creationId xmlns:p14="http://schemas.microsoft.com/office/powerpoint/2010/main" val="605908160"/>
+        <p14:creationId xmlns:p14="http://schemas.microsoft.com/office/powerpoint/2010/main" val="1584264251"/>
       </p:ext>
     </p:extLst>
   </p:cSld>
@@ -8327,6 +8423,145 @@
     <p:extLst>
       <p:ext uri="{BB962C8B-B14F-4D97-AF65-F5344CB8AC3E}">
         <p14:creationId xmlns:p14="http://schemas.microsoft.com/office/powerpoint/2010/main" val="2603909621"/>
+      </p:ext>
+    </p:extLst>
+  </p:cSld>
+  <p:clrMapOvr>
+    <a:masterClrMapping/>
+  </p:clrMapOvr>
+  <p:timing>
+    <p:tnLst>
+      <p:par>
+        <p:cTn id="1" dur="indefinite" restart="never" nodeType="tmRoot"/>
+      </p:par>
+    </p:tnLst>
+  </p:timing>
+</p:sld>
+</file>
+
+<file path=ppt/slides/slide20.xml><?xml version="1.0" encoding="utf-8"?>
+<p:sld xmlns:a="http://schemas.openxmlformats.org/drawingml/2006/main" xmlns:r="http://schemas.openxmlformats.org/officeDocument/2006/relationships" xmlns:p="http://schemas.openxmlformats.org/presentationml/2006/main">
+  <p:cSld>
+    <p:spTree>
+      <p:nvGrpSpPr>
+        <p:cNvPr id="1" name=""/>
+        <p:cNvGrpSpPr/>
+        <p:nvPr/>
+      </p:nvGrpSpPr>
+      <p:grpSpPr>
+        <a:xfrm>
+          <a:off x="0" y="0"/>
+          <a:ext cx="0" cy="0"/>
+          <a:chOff x="0" y="0"/>
+          <a:chExt cx="0" cy="0"/>
+        </a:xfrm>
+      </p:grpSpPr>
+      <p:sp>
+        <p:nvSpPr>
+          <p:cNvPr id="2" name="Titre 1"/>
+          <p:cNvSpPr>
+            <a:spLocks noGrp="1"/>
+          </p:cNvSpPr>
+          <p:nvPr>
+            <p:ph type="title"/>
+          </p:nvPr>
+        </p:nvSpPr>
+        <p:spPr/>
+        <p:txBody>
+          <a:bodyPr>
+            <a:normAutofit/>
+          </a:bodyPr>
+          <a:lstStyle/>
+          <a:p>
+            <a:r>
+              <a:rPr lang="fr-FR" dirty="0" smtClean="0"/>
+              <a:t>Exercice</a:t>
+            </a:r>
+            <a:endParaRPr lang="fr-MA" dirty="0"/>
+          </a:p>
+        </p:txBody>
+      </p:sp>
+      <p:sp>
+        <p:nvSpPr>
+          <p:cNvPr id="4" name="Rectangle 3"/>
+          <p:cNvSpPr/>
+          <p:nvPr/>
+        </p:nvSpPr>
+        <p:spPr>
+          <a:xfrm>
+            <a:off x="7537535" y="5938373"/>
+            <a:ext cx="4171719" cy="369332"/>
+          </a:xfrm>
+          <a:prstGeom prst="rect">
+            <a:avLst/>
+          </a:prstGeom>
+        </p:spPr>
+        <p:txBody>
+          <a:bodyPr wrap="none">
+            <a:spAutoFit/>
+          </a:bodyPr>
+          <a:lstStyle/>
+          <a:p>
+            <a:r>
+              <a:rPr lang="fr-MA" dirty="0" smtClean="0"/>
+              <a:t>Photos disponibles dans le dossier Exercice</a:t>
+            </a:r>
+            <a:endParaRPr lang="fr-MA" dirty="0"/>
+          </a:p>
+        </p:txBody>
+      </p:sp>
+      <p:sp>
+        <p:nvSpPr>
+          <p:cNvPr id="3" name="ZoneTexte 2"/>
+          <p:cNvSpPr txBox="1"/>
+          <p:nvPr/>
+        </p:nvSpPr>
+        <p:spPr>
+          <a:xfrm>
+            <a:off x="1956619" y="2772697"/>
+            <a:ext cx="8278762" cy="2585323"/>
+          </a:xfrm>
+          <a:prstGeom prst="rect">
+            <a:avLst/>
+          </a:prstGeom>
+          <a:noFill/>
+        </p:spPr>
+        <p:txBody>
+          <a:bodyPr wrap="square" rtlCol="0">
+            <a:spAutoFit/>
+          </a:bodyPr>
+          <a:lstStyle/>
+          <a:p>
+            <a:r>
+              <a:rPr lang="fr-FR" dirty="0" smtClean="0"/>
+              <a:t>Un couple du  nom de Jonathan et Mélanie viennent de passer leurs vacances aux Maldives, mais souhaitent cacher cela au père de Jonathan car il serait très mécontent de voir son fils dépenser excessivement l’argent qu’il lui a légué.</a:t>
+            </a:r>
+          </a:p>
+          <a:p>
+            <a:endParaRPr lang="fr-FR" dirty="0"/>
+          </a:p>
+          <a:p>
+            <a:r>
+              <a:rPr lang="fr-FR" dirty="0" smtClean="0"/>
+              <a:t>Aidez Jonathan a pouvoir envoyer une de ses photos de vacances à son père, sans que ce dernier s’aperçoit qu’il est aux îles Maldives.</a:t>
+            </a:r>
+          </a:p>
+          <a:p>
+            <a:endParaRPr lang="fr-FR" dirty="0"/>
+          </a:p>
+          <a:p>
+            <a:r>
+              <a:rPr lang="fr-FR" dirty="0" smtClean="0"/>
+              <a:t>N.B: Il semblerait que Jonathan nous a envoyé deux photos, une pour le découpage et l’autre ou il veut qu’on l’incruste avec sa conjointe Mélanie.</a:t>
+            </a:r>
+            <a:endParaRPr lang="fr-MA" dirty="0"/>
+          </a:p>
+        </p:txBody>
+      </p:sp>
+    </p:spTree>
+    <p:extLst>
+      <p:ext uri="{BB962C8B-B14F-4D97-AF65-F5344CB8AC3E}">
+        <p14:creationId xmlns:p14="http://schemas.microsoft.com/office/powerpoint/2010/main" val="605908160"/>
       </p:ext>
     </p:extLst>
   </p:cSld>

</xml_diff>